<commit_message>
update lecture 03 and 04
</commit_message>
<xml_diff>
--- a/lecture/Lecture 03 Aug 31/Lecture 03.1 DataTypes Pandas.pptx
+++ b/lecture/Lecture 03 Aug 31/Lecture 03.1 DataTypes Pandas.pptx
@@ -5,7 +5,7 @@
     <p:sldMasterId id="2147483684" r:id="rId1"/>
   </p:sldMasterIdLst>
   <p:notesMasterIdLst>
-    <p:notesMasterId r:id="rId9"/>
+    <p:notesMasterId r:id="rId10"/>
   </p:notesMasterIdLst>
   <p:sldIdLst>
     <p:sldId id="334" r:id="rId2"/>
@@ -15,6 +15,7 @@
     <p:sldId id="335" r:id="rId6"/>
     <p:sldId id="336" r:id="rId7"/>
     <p:sldId id="337" r:id="rId8"/>
+    <p:sldId id="341" r:id="rId9"/>
   </p:sldIdLst>
   <p:sldSz cx="9144000" cy="5143500" type="screen16x9"/>
   <p:notesSz cx="6858000" cy="9144000"/>
@@ -4323,21 +4324,6 @@
             </a:r>
             <a:endParaRPr lang="en-US" i="1" dirty="0"/>
           </a:p>
-          <a:p>
-            <a:r>
-              <a:rPr lang="en-US" dirty="0"/>
-              <a:t>Apply three different methods to access data in a Pandas </a:t>
-            </a:r>
-            <a:r>
-              <a:rPr lang="en-US" dirty="0" err="1"/>
-              <a:t>DataFrame</a:t>
-            </a:r>
-            <a:r>
-              <a:rPr lang="en-US" dirty="0"/>
-              <a:t> (Lecture 03.4)</a:t>
-            </a:r>
-            <a:endParaRPr lang="en-US" i="1" dirty="0"/>
-          </a:p>
         </p:txBody>
       </p:sp>
       <p:sp>
@@ -4695,6 +4681,201 @@
     <p:extLst>
       <p:ext uri="{BB962C8B-B14F-4D97-AF65-F5344CB8AC3E}">
         <p14:creationId xmlns:p14="http://schemas.microsoft.com/office/powerpoint/2010/main" val="748602916"/>
+      </p:ext>
+    </p:extLst>
+  </p:cSld>
+  <p:clrMapOvr>
+    <a:masterClrMapping/>
+  </p:clrMapOvr>
+</p:sld>
+</file>
+
+<file path=ppt/slides/slide8.xml><?xml version="1.0" encoding="utf-8"?>
+<p:sld xmlns:a="http://schemas.openxmlformats.org/drawingml/2006/main" xmlns:r="http://schemas.openxmlformats.org/officeDocument/2006/relationships" xmlns:p="http://schemas.openxmlformats.org/presentationml/2006/main">
+  <p:cSld>
+    <p:spTree>
+      <p:nvGrpSpPr>
+        <p:cNvPr id="1" name=""/>
+        <p:cNvGrpSpPr/>
+        <p:nvPr/>
+      </p:nvGrpSpPr>
+      <p:grpSpPr>
+        <a:xfrm>
+          <a:off x="0" y="0"/>
+          <a:ext cx="0" cy="0"/>
+          <a:chOff x="0" y="0"/>
+          <a:chExt cx="0" cy="0"/>
+        </a:xfrm>
+      </p:grpSpPr>
+      <p:sp>
+        <p:nvSpPr>
+          <p:cNvPr id="2" name="Title 1">
+            <a:extLst>
+              <a:ext uri="{FF2B5EF4-FFF2-40B4-BE49-F238E27FC236}">
+                <a16:creationId xmlns:a16="http://schemas.microsoft.com/office/drawing/2014/main" id="{7FEF4F34-913B-A347-99C2-CA9BC92CE28A}"/>
+              </a:ext>
+            </a:extLst>
+          </p:cNvPr>
+          <p:cNvSpPr>
+            <a:spLocks noGrp="1"/>
+          </p:cNvSpPr>
+          <p:nvPr>
+            <p:ph type="title"/>
+          </p:nvPr>
+        </p:nvSpPr>
+        <p:spPr/>
+        <p:txBody>
+          <a:bodyPr/>
+          <a:lstStyle/>
+          <a:p>
+            <a:r>
+              <a:rPr lang="en-US" dirty="0"/>
+              <a:t>Today’s objectives</a:t>
+            </a:r>
+          </a:p>
+        </p:txBody>
+      </p:sp>
+      <p:sp>
+        <p:nvSpPr>
+          <p:cNvPr id="3" name="Content Placeholder 2">
+            <a:extLst>
+              <a:ext uri="{FF2B5EF4-FFF2-40B4-BE49-F238E27FC236}">
+                <a16:creationId xmlns:a16="http://schemas.microsoft.com/office/drawing/2014/main" id="{C26A12AD-6139-5E4E-AB92-32946F66DE38}"/>
+              </a:ext>
+            </a:extLst>
+          </p:cNvPr>
+          <p:cNvSpPr>
+            <a:spLocks noGrp="1"/>
+          </p:cNvSpPr>
+          <p:nvPr>
+            <p:ph idx="1"/>
+          </p:nvPr>
+        </p:nvSpPr>
+        <p:spPr>
+          <a:xfrm>
+            <a:off x="628650" y="1268016"/>
+            <a:ext cx="7886700" cy="3263504"/>
+          </a:xfrm>
+        </p:spPr>
+        <p:txBody>
+          <a:bodyPr>
+            <a:normAutofit/>
+          </a:bodyPr>
+          <a:lstStyle/>
+          <a:p>
+            <a:r>
+              <a:rPr lang="en-US" dirty="0"/>
+              <a:t>Describe some of the modern elements of data science (</a:t>
+            </a:r>
+            <a:r>
+              <a:rPr lang="en-US" dirty="0" err="1"/>
+              <a:t>Blei</a:t>
+            </a:r>
+            <a:r>
+              <a:rPr lang="en-US" dirty="0"/>
+              <a:t> and Smyth)</a:t>
+            </a:r>
+          </a:p>
+          <a:p>
+            <a:r>
+              <a:rPr lang="en-US" dirty="0"/>
+              <a:t>Recite the main data types in Python (Lecture 03.2 notebook)</a:t>
+            </a:r>
+          </a:p>
+          <a:p>
+            <a:pPr lvl="1"/>
+            <a:r>
+              <a:rPr lang="en-US" dirty="0"/>
+              <a:t>String, int, float, bool,</a:t>
+            </a:r>
+          </a:p>
+          <a:p>
+            <a:r>
+              <a:rPr lang="en-US" dirty="0"/>
+              <a:t>Describe four different Python data structures and how they differ (Lecture 03.2)</a:t>
+            </a:r>
+          </a:p>
+          <a:p>
+            <a:pPr lvl="1"/>
+            <a:r>
+              <a:rPr lang="en-US" dirty="0"/>
+              <a:t>List, </a:t>
+            </a:r>
+            <a:r>
+              <a:rPr lang="en-US" dirty="0" err="1"/>
+              <a:t>dict</a:t>
+            </a:r>
+            <a:r>
+              <a:rPr lang="en-US" dirty="0"/>
+              <a:t>, tuple, set</a:t>
+            </a:r>
+          </a:p>
+          <a:p>
+            <a:r>
+              <a:rPr lang="en-US" dirty="0"/>
+              <a:t>Describe Pandas </a:t>
+            </a:r>
+            <a:r>
+              <a:rPr lang="en-US" dirty="0" err="1"/>
+              <a:t>DataFrames</a:t>
+            </a:r>
+            <a:r>
+              <a:rPr lang="en-US" dirty="0"/>
+              <a:t> as a </a:t>
+            </a:r>
+            <a:r>
+              <a:rPr lang="en-US" i="1" dirty="0" err="1"/>
+              <a:t>dict</a:t>
+            </a:r>
+            <a:r>
+              <a:rPr lang="en-US" dirty="0"/>
+              <a:t> of </a:t>
+            </a:r>
+            <a:r>
+              <a:rPr lang="en-US" i="1" dirty="0"/>
+              <a:t>lists </a:t>
+            </a:r>
+            <a:r>
+              <a:rPr lang="en-US" dirty="0"/>
+              <a:t>(Lecture 03.4)</a:t>
+            </a:r>
+            <a:endParaRPr lang="en-US" i="1" dirty="0"/>
+          </a:p>
+        </p:txBody>
+      </p:sp>
+      <p:sp>
+        <p:nvSpPr>
+          <p:cNvPr id="4" name="Slide Number Placeholder 3">
+            <a:extLst>
+              <a:ext uri="{FF2B5EF4-FFF2-40B4-BE49-F238E27FC236}">
+                <a16:creationId xmlns:a16="http://schemas.microsoft.com/office/drawing/2014/main" id="{BE04BAB2-78B9-A64F-84F9-5CAC88EBFE8C}"/>
+              </a:ext>
+            </a:extLst>
+          </p:cNvPr>
+          <p:cNvSpPr>
+            <a:spLocks noGrp="1"/>
+          </p:cNvSpPr>
+          <p:nvPr>
+            <p:ph type="sldNum" sz="quarter" idx="12"/>
+          </p:nvPr>
+        </p:nvSpPr>
+        <p:spPr/>
+        <p:txBody>
+          <a:bodyPr/>
+          <a:lstStyle/>
+          <a:p>
+            <a:fld id="{934C0642-4071-7D48-AFF8-BD27182896CC}" type="slidenum">
+              <a:rPr lang="en-US" smtClean="0"/>
+              <a:t>8</a:t>
+            </a:fld>
+            <a:endParaRPr lang="en-US"/>
+          </a:p>
+        </p:txBody>
+      </p:sp>
+    </p:spTree>
+    <p:extLst>
+      <p:ext uri="{BB962C8B-B14F-4D97-AF65-F5344CB8AC3E}">
+        <p14:creationId xmlns:p14="http://schemas.microsoft.com/office/powerpoint/2010/main" val="3025450061"/>
       </p:ext>
     </p:extLst>
   </p:cSld>

</xml_diff>

<commit_message>
update lecture 3 files
</commit_message>
<xml_diff>
--- a/lecture/Lecture 03 Aug 31/Lecture 03.1 DataTypes Pandas.pptx
+++ b/lecture/Lecture 03 Aug 31/Lecture 03.1 DataTypes Pandas.pptx
@@ -3468,8 +3468,13 @@
           <a:p>
             <a:r>
               <a:rPr lang="en-US" dirty="0"/>
-              <a:t>August 31, 2022</a:t>
-            </a:r>
+              <a:t>August 31</a:t>
+            </a:r>
+            <a:r>
+              <a:rPr lang="en-US"/>
+              <a:t>, 2023</a:t>
+            </a:r>
+            <a:endParaRPr lang="en-US" dirty="0"/>
           </a:p>
         </p:txBody>
       </p:sp>

</xml_diff>